<commit_message>
artefato 16 dfd 081020 1652
</commit_message>
<xml_diff>
--- a/artefatos/15 - Arquitetura de Negócio para cada Cenário.pptx
+++ b/artefatos/15 - Arquitetura de Negócio para cada Cenário.pptx
@@ -3054,15 +3054,7 @@
           <a:p>
             <a:r>
               <a:rPr lang="pt-BR" dirty="0" smtClean="0"/>
-              <a:t>3 </a:t>
-            </a:r>
-            <a:r>
-              <a:rPr lang="pt-BR" dirty="0" smtClean="0"/>
-              <a:t>- </a:t>
-            </a:r>
-            <a:r>
-              <a:rPr lang="pt-BR" dirty="0" smtClean="0"/>
-              <a:t>Cancelar pedido</a:t>
+              <a:t>3 - Cancelar pedido</a:t>
             </a:r>
             <a:r>
               <a:rPr lang="pt-BR" dirty="0"/>
@@ -3356,7 +3348,15 @@
             </a:r>
             <a:r>
               <a:rPr lang="pt-BR" dirty="0" smtClean="0"/>
-              <a:t> - Entregar matérias-primas.</a:t>
+              <a:t> - Entregar </a:t>
+            </a:r>
+            <a:r>
+              <a:rPr lang="pt-BR" dirty="0" smtClean="0"/>
+              <a:t>matérias-primas</a:t>
+            </a:r>
+            <a:r>
+              <a:rPr lang="pt-BR" dirty="0" smtClean="0"/>
+              <a:t>.</a:t>
             </a:r>
             <a:endParaRPr lang="pt-BR" dirty="0"/>
           </a:p>
@@ -3439,9 +3439,10 @@
           <a:p>
             <a:pPr algn="ctr"/>
             <a:r>
-              <a:rPr lang="pt-BR" dirty="0"/>
-              <a:t>Cliente</a:t>
-            </a:r>
+              <a:rPr lang="pt-BR" dirty="0" smtClean="0"/>
+              <a:t>Loja</a:t>
+            </a:r>
+            <a:endParaRPr lang="pt-BR" dirty="0"/>
           </a:p>
         </p:txBody>
       </p:sp>
@@ -3656,7 +3657,7 @@
           <p:cNvPr id="11" name="Retângulo de cantos arredondados 10">
             <a:extLst>
               <a:ext uri="{FF2B5EF4-FFF2-40B4-BE49-F238E27FC236}">
-                <a16:creationId xmlns:lc="http://schemas.openxmlformats.org/drawingml/2006/lockedCanvas" xmlns:a16="http://schemas.microsoft.com/office/drawing/2014/main" xmlns="" id="{67FC9C97-6BBA-4BFC-A5E1-2436DE02BBE2}"/>
+                <a16:creationId xmlns="" xmlns:a16="http://schemas.microsoft.com/office/drawing/2014/main" xmlns:lc="http://schemas.openxmlformats.org/drawingml/2006/lockedCanvas" id="{67FC9C97-6BBA-4BFC-A5E1-2436DE02BBE2}"/>
               </a:ext>
             </a:extLst>
           </p:cNvPr>
@@ -3970,9 +3971,10 @@
           <a:p>
             <a:pPr algn="ctr"/>
             <a:r>
-              <a:rPr lang="pt-BR" dirty="0"/>
-              <a:t>Cliente</a:t>
-            </a:r>
+              <a:rPr lang="pt-BR" dirty="0" smtClean="0"/>
+              <a:t>Loja</a:t>
+            </a:r>
+            <a:endParaRPr lang="pt-BR" dirty="0"/>
           </a:p>
         </p:txBody>
       </p:sp>
@@ -4187,7 +4189,7 @@
           <p:cNvPr id="11" name="Retângulo de cantos arredondados 10">
             <a:extLst>
               <a:ext uri="{FF2B5EF4-FFF2-40B4-BE49-F238E27FC236}">
-                <a16:creationId xmlns:lc="http://schemas.openxmlformats.org/drawingml/2006/lockedCanvas" xmlns:a16="http://schemas.microsoft.com/office/drawing/2014/main" xmlns="" id="{67FC9C97-6BBA-4BFC-A5E1-2436DE02BBE2}"/>
+                <a16:creationId xmlns="" xmlns:a16="http://schemas.microsoft.com/office/drawing/2014/main" xmlns:lc="http://schemas.openxmlformats.org/drawingml/2006/lockedCanvas" id="{67FC9C97-6BBA-4BFC-A5E1-2436DE02BBE2}"/>
               </a:ext>
             </a:extLst>
           </p:cNvPr>
@@ -4349,15 +4351,7 @@
             </a:r>
             <a:r>
               <a:rPr lang="pt-BR" b="1" dirty="0" smtClean="0"/>
-              <a:t>o </a:t>
-            </a:r>
-            <a:r>
-              <a:rPr lang="pt-BR" b="1" dirty="0" smtClean="0"/>
-              <a:t>pedido</a:t>
-            </a:r>
-            <a:r>
-              <a:rPr lang="pt-BR" b="1" dirty="0" smtClean="0"/>
-              <a:t>.</a:t>
+              <a:t>o pedido.</a:t>
             </a:r>
             <a:endParaRPr lang="pt-BR" dirty="0"/>
           </a:p>
@@ -4504,9 +4498,10 @@
           <a:p>
             <a:pPr algn="ctr"/>
             <a:r>
-              <a:rPr lang="pt-BR" dirty="0"/>
-              <a:t>Cliente</a:t>
-            </a:r>
+              <a:rPr lang="pt-BR" dirty="0" smtClean="0"/>
+              <a:t>Loja</a:t>
+            </a:r>
+            <a:endParaRPr lang="pt-BR" dirty="0"/>
           </a:p>
         </p:txBody>
       </p:sp>
@@ -4675,8 +4670,21 @@
                   <a:schemeClr val="tx1"/>
                 </a:solidFill>
               </a:rPr>
-              <a:t>Departamento de logística.</a:t>
-            </a:r>
+              <a:t>Departamento de </a:t>
+            </a:r>
+            <a:r>
+              <a:rPr lang="pt-BR" dirty="0" smtClean="0">
+                <a:solidFill>
+                  <a:schemeClr val="tx1"/>
+                </a:solidFill>
+              </a:rPr>
+              <a:t>Vendas.</a:t>
+            </a:r>
+            <a:endParaRPr lang="pt-BR" dirty="0" smtClean="0">
+              <a:solidFill>
+                <a:schemeClr val="tx1"/>
+              </a:solidFill>
+            </a:endParaRPr>
           </a:p>
           <a:p>
             <a:pPr algn="ctr"/>
@@ -4721,7 +4729,7 @@
           <p:cNvPr id="11" name="Retângulo de cantos arredondados 10">
             <a:extLst>
               <a:ext uri="{FF2B5EF4-FFF2-40B4-BE49-F238E27FC236}">
-                <a16:creationId xmlns:lc="http://schemas.openxmlformats.org/drawingml/2006/lockedCanvas" xmlns:a16="http://schemas.microsoft.com/office/drawing/2014/main" xmlns="" id="{67FC9C97-6BBA-4BFC-A5E1-2436DE02BBE2}"/>
+                <a16:creationId xmlns="" xmlns:a16="http://schemas.microsoft.com/office/drawing/2014/main" xmlns:lc="http://schemas.openxmlformats.org/drawingml/2006/lockedCanvas" id="{67FC9C97-6BBA-4BFC-A5E1-2436DE02BBE2}"/>
               </a:ext>
             </a:extLst>
           </p:cNvPr>
@@ -5035,9 +5043,10 @@
           <a:p>
             <a:pPr algn="ctr"/>
             <a:r>
-              <a:rPr lang="pt-BR" dirty="0"/>
-              <a:t>Cliente</a:t>
-            </a:r>
+              <a:rPr lang="pt-BR" dirty="0" smtClean="0"/>
+              <a:t>Loja</a:t>
+            </a:r>
+            <a:endParaRPr lang="pt-BR" dirty="0"/>
           </a:p>
         </p:txBody>
       </p:sp>
@@ -5252,7 +5261,7 @@
           <p:cNvPr id="11" name="Retângulo de cantos arredondados 10">
             <a:extLst>
               <a:ext uri="{FF2B5EF4-FFF2-40B4-BE49-F238E27FC236}">
-                <a16:creationId xmlns:lc="http://schemas.openxmlformats.org/drawingml/2006/lockedCanvas" xmlns:a16="http://schemas.microsoft.com/office/drawing/2014/main" xmlns="" id="{67FC9C97-6BBA-4BFC-A5E1-2436DE02BBE2}"/>
+                <a16:creationId xmlns="" xmlns:a16="http://schemas.microsoft.com/office/drawing/2014/main" xmlns:lc="http://schemas.openxmlformats.org/drawingml/2006/lockedCanvas" id="{67FC9C97-6BBA-4BFC-A5E1-2436DE02BBE2}"/>
               </a:ext>
             </a:extLst>
           </p:cNvPr>
@@ -5679,7 +5688,7 @@
           <p:cNvPr id="11" name="Retângulo de cantos arredondados 10">
             <a:extLst>
               <a:ext uri="{FF2B5EF4-FFF2-40B4-BE49-F238E27FC236}">
-                <a16:creationId xmlns:lc="http://schemas.openxmlformats.org/drawingml/2006/lockedCanvas" xmlns:a16="http://schemas.microsoft.com/office/drawing/2014/main" xmlns="" id="{67FC9C97-6BBA-4BFC-A5E1-2436DE02BBE2}"/>
+                <a16:creationId xmlns="" xmlns:a16="http://schemas.microsoft.com/office/drawing/2014/main" xmlns:lc="http://schemas.openxmlformats.org/drawingml/2006/lockedCanvas" id="{67FC9C97-6BBA-4BFC-A5E1-2436DE02BBE2}"/>
               </a:ext>
             </a:extLst>
           </p:cNvPr>
@@ -6206,7 +6215,7 @@
           <p:cNvPr id="11" name="Retângulo de cantos arredondados 10">
             <a:extLst>
               <a:ext uri="{FF2B5EF4-FFF2-40B4-BE49-F238E27FC236}">
-                <a16:creationId xmlns:lc="http://schemas.openxmlformats.org/drawingml/2006/lockedCanvas" xmlns:a16="http://schemas.microsoft.com/office/drawing/2014/main" xmlns="" id="{67FC9C97-6BBA-4BFC-A5E1-2436DE02BBE2}"/>
+                <a16:creationId xmlns="" xmlns:a16="http://schemas.microsoft.com/office/drawing/2014/main" xmlns:lc="http://schemas.openxmlformats.org/drawingml/2006/lockedCanvas" id="{67FC9C97-6BBA-4BFC-A5E1-2436DE02BBE2}"/>
               </a:ext>
             </a:extLst>
           </p:cNvPr>
@@ -6738,7 +6747,7 @@
           <p:cNvPr id="11" name="Retângulo de cantos arredondados 10">
             <a:extLst>
               <a:ext uri="{FF2B5EF4-FFF2-40B4-BE49-F238E27FC236}">
-                <a16:creationId xmlns:lc="http://schemas.openxmlformats.org/drawingml/2006/lockedCanvas" xmlns:a16="http://schemas.microsoft.com/office/drawing/2014/main" xmlns="" id="{67FC9C97-6BBA-4BFC-A5E1-2436DE02BBE2}"/>
+                <a16:creationId xmlns="" xmlns:a16="http://schemas.microsoft.com/office/drawing/2014/main" xmlns:lc="http://schemas.openxmlformats.org/drawingml/2006/lockedCanvas" id="{67FC9C97-6BBA-4BFC-A5E1-2436DE02BBE2}"/>
               </a:ext>
             </a:extLst>
           </p:cNvPr>
@@ -7265,7 +7274,7 @@
           <p:cNvPr id="11" name="Retângulo de cantos arredondados 10">
             <a:extLst>
               <a:ext uri="{FF2B5EF4-FFF2-40B4-BE49-F238E27FC236}">
-                <a16:creationId xmlns:lc="http://schemas.openxmlformats.org/drawingml/2006/lockedCanvas" xmlns:a16="http://schemas.microsoft.com/office/drawing/2014/main" xmlns="" id="{67FC9C97-6BBA-4BFC-A5E1-2436DE02BBE2}"/>
+                <a16:creationId xmlns="" xmlns:a16="http://schemas.microsoft.com/office/drawing/2014/main" xmlns:lc="http://schemas.openxmlformats.org/drawingml/2006/lockedCanvas" id="{67FC9C97-6BBA-4BFC-A5E1-2436DE02BBE2}"/>
               </a:ext>
             </a:extLst>
           </p:cNvPr>
@@ -7423,11 +7432,7 @@
             <a:pPr algn="ctr"/>
             <a:r>
               <a:rPr lang="pt-BR" b="1" dirty="0" smtClean="0"/>
-              <a:t>Tratar o </a:t>
-            </a:r>
-            <a:r>
-              <a:rPr lang="pt-BR" b="1" dirty="0" smtClean="0"/>
-              <a:t>cancelamento da compra.</a:t>
+              <a:t>Tratar o cancelamento da compra.</a:t>
             </a:r>
             <a:endParaRPr lang="pt-BR" dirty="0"/>
           </a:p>
@@ -7576,8 +7581,21 @@
                   <a:schemeClr val="tx1"/>
                 </a:solidFill>
               </a:rPr>
-              <a:t>Departamento de logística.</a:t>
-            </a:r>
+              <a:t>Departamento de </a:t>
+            </a:r>
+            <a:r>
+              <a:rPr lang="pt-BR" dirty="0" smtClean="0">
+                <a:solidFill>
+                  <a:schemeClr val="tx1"/>
+                </a:solidFill>
+              </a:rPr>
+              <a:t>Compras.</a:t>
+            </a:r>
+            <a:endParaRPr lang="pt-BR" dirty="0" smtClean="0">
+              <a:solidFill>
+                <a:schemeClr val="tx1"/>
+              </a:solidFill>
+            </a:endParaRPr>
           </a:p>
           <a:p>
             <a:pPr algn="ctr"/>

</xml_diff>

<commit_message>
Rafatorando artefato 15 e 16 , com 3 artefato
</commit_message>
<xml_diff>
--- a/artefatos/15 - Arquitetura de Negócio para cada Cenário.pptx
+++ b/artefatos/15 - Arquitetura de Negócio para cada Cenário.pptx
@@ -244,7 +244,7 @@
           <a:p>
             <a:fld id="{B318167A-7346-46C7-A193-E3829EEED7F1}" type="datetimeFigureOut">
               <a:rPr lang="pt-BR" smtClean="0"/>
-              <a:t>23/10/2020</a:t>
+              <a:t>04/11/2020</a:t>
             </a:fld>
             <a:endParaRPr lang="pt-BR"/>
           </a:p>
@@ -412,7 +412,7 @@
           <a:p>
             <a:fld id="{B318167A-7346-46C7-A193-E3829EEED7F1}" type="datetimeFigureOut">
               <a:rPr lang="pt-BR" smtClean="0"/>
-              <a:t>23/10/2020</a:t>
+              <a:t>04/11/2020</a:t>
             </a:fld>
             <a:endParaRPr lang="pt-BR"/>
           </a:p>
@@ -590,7 +590,7 @@
           <a:p>
             <a:fld id="{B318167A-7346-46C7-A193-E3829EEED7F1}" type="datetimeFigureOut">
               <a:rPr lang="pt-BR" smtClean="0"/>
-              <a:t>23/10/2020</a:t>
+              <a:t>04/11/2020</a:t>
             </a:fld>
             <a:endParaRPr lang="pt-BR"/>
           </a:p>
@@ -758,7 +758,7 @@
           <a:p>
             <a:fld id="{B318167A-7346-46C7-A193-E3829EEED7F1}" type="datetimeFigureOut">
               <a:rPr lang="pt-BR" smtClean="0"/>
-              <a:t>23/10/2020</a:t>
+              <a:t>04/11/2020</a:t>
             </a:fld>
             <a:endParaRPr lang="pt-BR"/>
           </a:p>
@@ -1003,7 +1003,7 @@
           <a:p>
             <a:fld id="{B318167A-7346-46C7-A193-E3829EEED7F1}" type="datetimeFigureOut">
               <a:rPr lang="pt-BR" smtClean="0"/>
-              <a:t>23/10/2020</a:t>
+              <a:t>04/11/2020</a:t>
             </a:fld>
             <a:endParaRPr lang="pt-BR"/>
           </a:p>
@@ -1232,7 +1232,7 @@
           <a:p>
             <a:fld id="{B318167A-7346-46C7-A193-E3829EEED7F1}" type="datetimeFigureOut">
               <a:rPr lang="pt-BR" smtClean="0"/>
-              <a:t>23/10/2020</a:t>
+              <a:t>04/11/2020</a:t>
             </a:fld>
             <a:endParaRPr lang="pt-BR"/>
           </a:p>
@@ -1596,7 +1596,7 @@
           <a:p>
             <a:fld id="{B318167A-7346-46C7-A193-E3829EEED7F1}" type="datetimeFigureOut">
               <a:rPr lang="pt-BR" smtClean="0"/>
-              <a:t>23/10/2020</a:t>
+              <a:t>04/11/2020</a:t>
             </a:fld>
             <a:endParaRPr lang="pt-BR"/>
           </a:p>
@@ -1713,7 +1713,7 @@
           <a:p>
             <a:fld id="{B318167A-7346-46C7-A193-E3829EEED7F1}" type="datetimeFigureOut">
               <a:rPr lang="pt-BR" smtClean="0"/>
-              <a:t>23/10/2020</a:t>
+              <a:t>04/11/2020</a:t>
             </a:fld>
             <a:endParaRPr lang="pt-BR"/>
           </a:p>
@@ -1808,7 +1808,7 @@
           <a:p>
             <a:fld id="{B318167A-7346-46C7-A193-E3829EEED7F1}" type="datetimeFigureOut">
               <a:rPr lang="pt-BR" smtClean="0"/>
-              <a:t>23/10/2020</a:t>
+              <a:t>04/11/2020</a:t>
             </a:fld>
             <a:endParaRPr lang="pt-BR"/>
           </a:p>
@@ -2083,7 +2083,7 @@
           <a:p>
             <a:fld id="{B318167A-7346-46C7-A193-E3829EEED7F1}" type="datetimeFigureOut">
               <a:rPr lang="pt-BR" smtClean="0"/>
-              <a:t>23/10/2020</a:t>
+              <a:t>04/11/2020</a:t>
             </a:fld>
             <a:endParaRPr lang="pt-BR"/>
           </a:p>
@@ -2335,7 +2335,7 @@
           <a:p>
             <a:fld id="{B318167A-7346-46C7-A193-E3829EEED7F1}" type="datetimeFigureOut">
               <a:rPr lang="pt-BR" smtClean="0"/>
-              <a:t>23/10/2020</a:t>
+              <a:t>04/11/2020</a:t>
             </a:fld>
             <a:endParaRPr lang="pt-BR"/>
           </a:p>
@@ -2546,7 +2546,7 @@
           <a:p>
             <a:fld id="{B318167A-7346-46C7-A193-E3829EEED7F1}" type="datetimeFigureOut">
               <a:rPr lang="pt-BR" smtClean="0"/>
-              <a:t>23/10/2020</a:t>
+              <a:t>04/11/2020</a:t>
             </a:fld>
             <a:endParaRPr lang="pt-BR"/>
           </a:p>
@@ -2990,10 +2990,9 @@
           <a:p>
             <a:pPr algn="ctr"/>
             <a:r>
-              <a:rPr lang="pt-BR" dirty="0" smtClean="0"/>
+              <a:rPr lang="pt-BR" dirty="0"/>
               <a:t>Loja</a:t>
             </a:r>
-            <a:endParaRPr lang="pt-BR" dirty="0"/>
           </a:p>
         </p:txBody>
       </p:sp>
@@ -3021,41 +3020,20 @@
           <a:p>
             <a:r>
               <a:rPr lang="pt-BR" dirty="0"/>
-              <a:t>1</a:t>
-            </a:r>
-            <a:r>
-              <a:rPr lang="pt-BR" dirty="0" smtClean="0"/>
-              <a:t> - Solicitar orçamento.</a:t>
+              <a:t>1 - Solicitar orçamento.</a:t>
             </a:r>
           </a:p>
           <a:p>
             <a:r>
               <a:rPr lang="pt-BR" dirty="0"/>
-              <a:t>2</a:t>
-            </a:r>
-            <a:r>
-              <a:rPr lang="pt-BR" dirty="0" smtClean="0"/>
-              <a:t> </a:t>
-            </a:r>
+              <a:t>2 - Fazer pedido.</a:t>
+            </a:r>
+          </a:p>
+          <a:p>
             <a:r>
               <a:rPr lang="pt-BR" dirty="0"/>
-              <a:t>-</a:t>
-            </a:r>
-            <a:r>
-              <a:rPr lang="pt-BR" dirty="0" smtClean="0"/>
-              <a:t> Fazer pedido.</a:t>
-            </a:r>
-          </a:p>
-          <a:p>
-            <a:r>
-              <a:rPr lang="pt-BR" dirty="0" smtClean="0"/>
-              <a:t>3 - Cancelar pedido</a:t>
-            </a:r>
-            <a:r>
-              <a:rPr lang="pt-BR" dirty="0" smtClean="0"/>
-              <a:t>.</a:t>
-            </a:r>
-            <a:endParaRPr lang="pt-BR" dirty="0"/>
+              <a:t>3 - Cancelar pedido.</a:t>
+            </a:r>
           </a:p>
         </p:txBody>
       </p:sp>
@@ -3124,18 +3102,18 @@
           <a:p>
             <a:pPr algn="ctr"/>
             <a:r>
-              <a:rPr lang="pt-BR" sz="3200" dirty="0" smtClean="0"/>
+              <a:rPr lang="pt-BR" sz="3200" dirty="0"/>
               <a:t>Fábrica de </a:t>
             </a:r>
           </a:p>
           <a:p>
             <a:pPr algn="ctr"/>
             <a:r>
-              <a:rPr lang="pt-BR" sz="3200" dirty="0" smtClean="0"/>
+              <a:rPr lang="pt-BR" sz="3200" dirty="0"/>
               <a:t>Sorvetes </a:t>
             </a:r>
             <a:r>
-              <a:rPr lang="pt-BR" sz="3200" dirty="0" err="1" smtClean="0"/>
+              <a:rPr lang="pt-BR" sz="3200" dirty="0" err="1"/>
               <a:t>Sorvetunes</a:t>
             </a:r>
             <a:endParaRPr lang="pt-BR" sz="3200" dirty="0"/>
@@ -3274,10 +3252,9 @@
           <a:p>
             <a:pPr algn="ctr"/>
             <a:r>
-              <a:rPr lang="pt-BR" dirty="0" smtClean="0"/>
+              <a:rPr lang="pt-BR" dirty="0"/>
               <a:t>Loja</a:t>
             </a:r>
-            <a:endParaRPr lang="pt-BR" dirty="0"/>
           </a:p>
         </p:txBody>
       </p:sp>
@@ -3424,7 +3401,7 @@
           <a:lstStyle/>
           <a:p>
             <a:pPr algn="ctr"/>
-            <a:endParaRPr lang="pt-BR" dirty="0" smtClean="0">
+            <a:endParaRPr lang="pt-BR" dirty="0">
               <a:solidFill>
                 <a:schemeClr val="tx1"/>
               </a:solidFill>
@@ -3441,7 +3418,7 @@
           <a:p>
             <a:pPr algn="ctr"/>
             <a:r>
-              <a:rPr lang="pt-BR" dirty="0" smtClean="0">
+              <a:rPr lang="pt-BR" dirty="0">
                 <a:solidFill>
                   <a:schemeClr val="tx1"/>
                 </a:solidFill>
@@ -3492,7 +3469,7 @@
           <p:cNvPr id="11" name="Retângulo de cantos arredondados 10">
             <a:extLst>
               <a:ext uri="{FF2B5EF4-FFF2-40B4-BE49-F238E27FC236}">
-                <a16:creationId xmlns="" xmlns:a16="http://schemas.microsoft.com/office/drawing/2014/main" xmlns:lc="http://schemas.openxmlformats.org/drawingml/2006/lockedCanvas" id="{67FC9C97-6BBA-4BFC-A5E1-2436DE02BBE2}"/>
+                <a16:creationId xmlns:a16="http://schemas.microsoft.com/office/drawing/2014/main" id="{67FC9C97-6BBA-4BFC-A5E1-2436DE02BBE2}"/>
               </a:ext>
             </a:extLst>
           </p:cNvPr>
@@ -3650,11 +3627,7 @@
             <a:pPr algn="ctr"/>
             <a:r>
               <a:rPr lang="pt-BR" b="1" dirty="0"/>
-              <a:t>Tratar </a:t>
-            </a:r>
-            <a:r>
-              <a:rPr lang="pt-BR" b="1" dirty="0" smtClean="0"/>
-              <a:t>o orçamento.</a:t>
+              <a:t>Tratar o orçamento.</a:t>
             </a:r>
             <a:endParaRPr lang="pt-BR" dirty="0"/>
           </a:p>
@@ -3694,13 +3667,8 @@
           <a:p>
             <a:r>
               <a:rPr lang="pt-BR" dirty="0"/>
-              <a:t>Cenário: Solicitar </a:t>
-            </a:r>
-            <a:r>
-              <a:rPr lang="pt-BR" dirty="0" smtClean="0"/>
-              <a:t>orçamento</a:t>
-            </a:r>
-            <a:endParaRPr lang="pt-BR" dirty="0"/>
+              <a:t>Cenário: Solicitar orçamento</a:t>
+            </a:r>
           </a:p>
         </p:txBody>
       </p:sp>
@@ -3732,7 +3700,7 @@
               <a:t>Sorveteria </a:t>
             </a:r>
             <a:r>
-              <a:rPr lang="pt-BR" sz="2400" dirty="0" err="1" smtClean="0"/>
+              <a:rPr lang="pt-BR" sz="2400" dirty="0" err="1"/>
               <a:t>Sorvetunes</a:t>
             </a:r>
             <a:endParaRPr lang="pt-BR" sz="2400" dirty="0"/>
@@ -3806,10 +3774,9 @@
           <a:p>
             <a:pPr algn="ctr"/>
             <a:r>
-              <a:rPr lang="pt-BR" dirty="0" smtClean="0"/>
+              <a:rPr lang="pt-BR" dirty="0"/>
               <a:t>Loja</a:t>
             </a:r>
-            <a:endParaRPr lang="pt-BR" dirty="0"/>
           </a:p>
         </p:txBody>
       </p:sp>
@@ -3956,7 +3923,7 @@
           <a:lstStyle/>
           <a:p>
             <a:pPr algn="ctr"/>
-            <a:endParaRPr lang="pt-BR" dirty="0" smtClean="0">
+            <a:endParaRPr lang="pt-BR" dirty="0">
               <a:solidFill>
                 <a:schemeClr val="tx1"/>
               </a:solidFill>
@@ -3973,7 +3940,7 @@
           <a:p>
             <a:pPr algn="ctr"/>
             <a:r>
-              <a:rPr lang="pt-BR" dirty="0" smtClean="0">
+              <a:rPr lang="pt-BR" dirty="0">
                 <a:solidFill>
                   <a:schemeClr val="tx1"/>
                 </a:solidFill>
@@ -4024,7 +3991,7 @@
           <p:cNvPr id="11" name="Retângulo de cantos arredondados 10">
             <a:extLst>
               <a:ext uri="{FF2B5EF4-FFF2-40B4-BE49-F238E27FC236}">
-                <a16:creationId xmlns="" xmlns:a16="http://schemas.microsoft.com/office/drawing/2014/main" xmlns:lc="http://schemas.openxmlformats.org/drawingml/2006/lockedCanvas" id="{67FC9C97-6BBA-4BFC-A5E1-2436DE02BBE2}"/>
+                <a16:creationId xmlns:a16="http://schemas.microsoft.com/office/drawing/2014/main" id="{67FC9C97-6BBA-4BFC-A5E1-2436DE02BBE2}"/>
               </a:ext>
             </a:extLst>
           </p:cNvPr>
@@ -4182,11 +4149,7 @@
             <a:pPr algn="ctr"/>
             <a:r>
               <a:rPr lang="pt-BR" b="1" dirty="0"/>
-              <a:t>Tratar </a:t>
-            </a:r>
-            <a:r>
-              <a:rPr lang="pt-BR" b="1" dirty="0" smtClean="0"/>
-              <a:t>o pedido.</a:t>
+              <a:t>Tratar o pedido.</a:t>
             </a:r>
             <a:endParaRPr lang="pt-BR" dirty="0"/>
           </a:p>
@@ -4259,7 +4222,7 @@
               <a:t>Sorveteria </a:t>
             </a:r>
             <a:r>
-              <a:rPr lang="pt-BR" sz="2400" dirty="0" err="1" smtClean="0"/>
+              <a:rPr lang="pt-BR" sz="2400" dirty="0" err="1"/>
               <a:t>Sorvetunes</a:t>
             </a:r>
             <a:endParaRPr lang="pt-BR" sz="2400" dirty="0"/>
@@ -4333,10 +4296,9 @@
           <a:p>
             <a:pPr algn="ctr"/>
             <a:r>
-              <a:rPr lang="pt-BR" dirty="0" smtClean="0"/>
+              <a:rPr lang="pt-BR" dirty="0"/>
               <a:t>Loja</a:t>
             </a:r>
-            <a:endParaRPr lang="pt-BR" dirty="0"/>
           </a:p>
         </p:txBody>
       </p:sp>
@@ -4378,8 +4340,8 @@
         </p:nvSpPr>
         <p:spPr>
           <a:xfrm>
-            <a:off x="7732820" y="1790807"/>
-            <a:ext cx="3464417" cy="4005261"/>
+            <a:off x="5345724" y="1800665"/>
+            <a:ext cx="5851514" cy="3995403"/>
           </a:xfrm>
           <a:prstGeom prst="roundRect">
             <a:avLst/>
@@ -4449,11 +4411,13 @@
         </p:nvSpPr>
         <p:spPr>
           <a:xfrm>
-            <a:off x="8257014" y="3007512"/>
+            <a:off x="8276606" y="3130127"/>
             <a:ext cx="2478041" cy="995369"/>
           </a:xfrm>
           <a:prstGeom prst="cube">
-            <a:avLst/>
+            <a:avLst>
+              <a:gd name="adj" fmla="val 25000"/>
+            </a:avLst>
           </a:prstGeom>
           <a:solidFill>
             <a:schemeClr val="accent4">
@@ -4483,7 +4447,7 @@
           <a:lstStyle/>
           <a:p>
             <a:pPr algn="ctr"/>
-            <a:endParaRPr lang="pt-BR" dirty="0" smtClean="0">
+            <a:endParaRPr lang="pt-BR" dirty="0">
               <a:solidFill>
                 <a:schemeClr val="tx1"/>
               </a:solidFill>
@@ -4500,7 +4464,7 @@
           <a:p>
             <a:pPr algn="ctr"/>
             <a:r>
-              <a:rPr lang="pt-BR" dirty="0" smtClean="0">
+              <a:rPr lang="pt-BR" dirty="0">
                 <a:solidFill>
                   <a:schemeClr val="tx1"/>
                 </a:solidFill>
@@ -4551,7 +4515,7 @@
           <p:cNvPr id="11" name="Retângulo de cantos arredondados 10">
             <a:extLst>
               <a:ext uri="{FF2B5EF4-FFF2-40B4-BE49-F238E27FC236}">
-                <a16:creationId xmlns="" xmlns:a16="http://schemas.microsoft.com/office/drawing/2014/main" xmlns:lc="http://schemas.openxmlformats.org/drawingml/2006/lockedCanvas" id="{67FC9C97-6BBA-4BFC-A5E1-2436DE02BBE2}"/>
+                <a16:creationId xmlns:a16="http://schemas.microsoft.com/office/drawing/2014/main" id="{67FC9C97-6BBA-4BFC-A5E1-2436DE02BBE2}"/>
               </a:ext>
             </a:extLst>
           </p:cNvPr>
@@ -4709,11 +4673,7 @@
             <a:pPr algn="ctr"/>
             <a:r>
               <a:rPr lang="pt-BR" b="1" dirty="0"/>
-              <a:t>Tratar </a:t>
-            </a:r>
-            <a:r>
-              <a:rPr lang="pt-BR" b="1" dirty="0" smtClean="0"/>
-              <a:t>o cancelamento do pedido.</a:t>
+              <a:t>Tratar o cancelamento do pedido.</a:t>
             </a:r>
             <a:endParaRPr lang="pt-BR" dirty="0"/>
           </a:p>
@@ -4753,13 +4713,8 @@
           <a:p>
             <a:r>
               <a:rPr lang="pt-BR" dirty="0"/>
-              <a:t>Cenário: </a:t>
-            </a:r>
-            <a:r>
-              <a:rPr lang="pt-BR" dirty="0" smtClean="0"/>
-              <a:t>Cancelar Pedido</a:t>
-            </a:r>
-            <a:endParaRPr lang="pt-BR" dirty="0"/>
+              <a:t>Cenário: Cancelar Pedido</a:t>
+            </a:r>
           </a:p>
         </p:txBody>
       </p:sp>
@@ -4791,10 +4746,123 @@
               <a:t>Sorveteria </a:t>
             </a:r>
             <a:r>
-              <a:rPr lang="pt-BR" sz="2400" dirty="0" err="1" smtClean="0"/>
+              <a:rPr lang="pt-BR" sz="2400" dirty="0" err="1"/>
               <a:t>Sorvetunes</a:t>
             </a:r>
             <a:endParaRPr lang="pt-BR" sz="2400" dirty="0"/>
+          </a:p>
+        </p:txBody>
+      </p:sp>
+      <p:sp>
+        <p:nvSpPr>
+          <p:cNvPr id="2" name="Cubo 1">
+            <a:extLst>
+              <a:ext uri="{FF2B5EF4-FFF2-40B4-BE49-F238E27FC236}">
+                <a16:creationId xmlns:a16="http://schemas.microsoft.com/office/drawing/2014/main" id="{DB606855-E1B0-4F56-AA21-D3C329E437AF}"/>
+              </a:ext>
+            </a:extLst>
+          </p:cNvPr>
+          <p:cNvSpPr/>
+          <p:nvPr/>
+        </p:nvSpPr>
+        <p:spPr>
+          <a:xfrm>
+            <a:off x="5516876" y="3183835"/>
+            <a:ext cx="2478041" cy="995369"/>
+          </a:xfrm>
+          <a:prstGeom prst="cube">
+            <a:avLst>
+              <a:gd name="adj" fmla="val 25000"/>
+            </a:avLst>
+          </a:prstGeom>
+          <a:solidFill>
+            <a:schemeClr val="accent4">
+              <a:lumMod val="60000"/>
+              <a:lumOff val="40000"/>
+            </a:schemeClr>
+          </a:solidFill>
+        </p:spPr>
+        <p:style>
+          <a:lnRef idx="2">
+            <a:schemeClr val="accent1">
+              <a:shade val="50000"/>
+            </a:schemeClr>
+          </a:lnRef>
+          <a:fillRef idx="1">
+            <a:schemeClr val="accent1"/>
+          </a:fillRef>
+          <a:effectRef idx="0">
+            <a:schemeClr val="accent1"/>
+          </a:effectRef>
+          <a:fontRef idx="minor">
+            <a:schemeClr val="lt1"/>
+          </a:fontRef>
+        </p:style>
+        <p:txBody>
+          <a:bodyPr rtlCol="0" anchor="ctr"/>
+          <a:lstStyle/>
+          <a:p>
+            <a:pPr algn="ctr"/>
+            <a:endParaRPr lang="pt-BR" dirty="0">
+              <a:solidFill>
+                <a:schemeClr val="tx1"/>
+              </a:solidFill>
+            </a:endParaRPr>
+          </a:p>
+          <a:p>
+            <a:pPr algn="ctr"/>
+            <a:endParaRPr lang="pt-BR" dirty="0">
+              <a:solidFill>
+                <a:schemeClr val="tx1"/>
+              </a:solidFill>
+            </a:endParaRPr>
+          </a:p>
+          <a:p>
+            <a:pPr algn="ctr"/>
+            <a:r>
+              <a:rPr lang="pt-BR" dirty="0">
+                <a:solidFill>
+                  <a:schemeClr val="tx1"/>
+                </a:solidFill>
+              </a:rPr>
+              <a:t>Departamento Financeiro.</a:t>
+            </a:r>
+          </a:p>
+          <a:p>
+            <a:pPr algn="ctr"/>
+            <a:r>
+              <a:rPr lang="pt-BR" b="1" dirty="0">
+                <a:solidFill>
+                  <a:schemeClr val="bg1">
+                    <a:lumMod val="65000"/>
+                  </a:schemeClr>
+                </a:solidFill>
+              </a:rPr>
+              <a:t>(Nó Operacional)</a:t>
+            </a:r>
+          </a:p>
+          <a:p>
+            <a:pPr fontAlgn="base">
+              <a:spcBef>
+                <a:spcPct val="0"/>
+              </a:spcBef>
+              <a:spcAft>
+                <a:spcPct val="0"/>
+              </a:spcAft>
+            </a:pPr>
+            <a:endParaRPr lang="pt-BR" dirty="0">
+              <a:solidFill>
+                <a:srgbClr val="000000"/>
+              </a:solidFill>
+              <a:latin typeface="Gill Sans" charset="0"/>
+              <a:ea typeface="ヒラギノ角ゴ ProN W3" charset="0"/>
+              <a:cs typeface="ヒラギノ角ゴ ProN W3" charset="0"/>
+              <a:sym typeface="Gill Sans" charset="0"/>
+            </a:endParaRPr>
+          </a:p>
+          <a:p>
+            <a:pPr algn="ctr"/>
+            <a:endParaRPr lang="pt-BR" dirty="0"/>
           </a:p>
         </p:txBody>
       </p:sp>

</xml_diff>

<commit_message>
Refatorando artefatos de acordo com o feedback da ac4
</commit_message>
<xml_diff>
--- a/artefatos/15 - Arquitetura de Negócio para cada Cenário.pptx
+++ b/artefatos/15 - Arquitetura de Negócio para cada Cenário.pptx
@@ -244,7 +244,7 @@
           <a:p>
             <a:fld id="{B318167A-7346-46C7-A193-E3829EEED7F1}" type="datetimeFigureOut">
               <a:rPr lang="pt-BR" smtClean="0"/>
-              <a:t>04/11/2020</a:t>
+              <a:t>11/11/2020</a:t>
             </a:fld>
             <a:endParaRPr lang="pt-BR"/>
           </a:p>
@@ -412,7 +412,7 @@
           <a:p>
             <a:fld id="{B318167A-7346-46C7-A193-E3829EEED7F1}" type="datetimeFigureOut">
               <a:rPr lang="pt-BR" smtClean="0"/>
-              <a:t>04/11/2020</a:t>
+              <a:t>11/11/2020</a:t>
             </a:fld>
             <a:endParaRPr lang="pt-BR"/>
           </a:p>
@@ -590,7 +590,7 @@
           <a:p>
             <a:fld id="{B318167A-7346-46C7-A193-E3829EEED7F1}" type="datetimeFigureOut">
               <a:rPr lang="pt-BR" smtClean="0"/>
-              <a:t>04/11/2020</a:t>
+              <a:t>11/11/2020</a:t>
             </a:fld>
             <a:endParaRPr lang="pt-BR"/>
           </a:p>
@@ -758,7 +758,7 @@
           <a:p>
             <a:fld id="{B318167A-7346-46C7-A193-E3829EEED7F1}" type="datetimeFigureOut">
               <a:rPr lang="pt-BR" smtClean="0"/>
-              <a:t>04/11/2020</a:t>
+              <a:t>11/11/2020</a:t>
             </a:fld>
             <a:endParaRPr lang="pt-BR"/>
           </a:p>
@@ -1003,7 +1003,7 @@
           <a:p>
             <a:fld id="{B318167A-7346-46C7-A193-E3829EEED7F1}" type="datetimeFigureOut">
               <a:rPr lang="pt-BR" smtClean="0"/>
-              <a:t>04/11/2020</a:t>
+              <a:t>11/11/2020</a:t>
             </a:fld>
             <a:endParaRPr lang="pt-BR"/>
           </a:p>
@@ -1232,7 +1232,7 @@
           <a:p>
             <a:fld id="{B318167A-7346-46C7-A193-E3829EEED7F1}" type="datetimeFigureOut">
               <a:rPr lang="pt-BR" smtClean="0"/>
-              <a:t>04/11/2020</a:t>
+              <a:t>11/11/2020</a:t>
             </a:fld>
             <a:endParaRPr lang="pt-BR"/>
           </a:p>
@@ -1596,7 +1596,7 @@
           <a:p>
             <a:fld id="{B318167A-7346-46C7-A193-E3829EEED7F1}" type="datetimeFigureOut">
               <a:rPr lang="pt-BR" smtClean="0"/>
-              <a:t>04/11/2020</a:t>
+              <a:t>11/11/2020</a:t>
             </a:fld>
             <a:endParaRPr lang="pt-BR"/>
           </a:p>
@@ -1713,7 +1713,7 @@
           <a:p>
             <a:fld id="{B318167A-7346-46C7-A193-E3829EEED7F1}" type="datetimeFigureOut">
               <a:rPr lang="pt-BR" smtClean="0"/>
-              <a:t>04/11/2020</a:t>
+              <a:t>11/11/2020</a:t>
             </a:fld>
             <a:endParaRPr lang="pt-BR"/>
           </a:p>
@@ -1808,7 +1808,7 @@
           <a:p>
             <a:fld id="{B318167A-7346-46C7-A193-E3829EEED7F1}" type="datetimeFigureOut">
               <a:rPr lang="pt-BR" smtClean="0"/>
-              <a:t>04/11/2020</a:t>
+              <a:t>11/11/2020</a:t>
             </a:fld>
             <a:endParaRPr lang="pt-BR"/>
           </a:p>
@@ -2083,7 +2083,7 @@
           <a:p>
             <a:fld id="{B318167A-7346-46C7-A193-E3829EEED7F1}" type="datetimeFigureOut">
               <a:rPr lang="pt-BR" smtClean="0"/>
-              <a:t>04/11/2020</a:t>
+              <a:t>11/11/2020</a:t>
             </a:fld>
             <a:endParaRPr lang="pt-BR"/>
           </a:p>
@@ -2335,7 +2335,7 @@
           <a:p>
             <a:fld id="{B318167A-7346-46C7-A193-E3829EEED7F1}" type="datetimeFigureOut">
               <a:rPr lang="pt-BR" smtClean="0"/>
-              <a:t>04/11/2020</a:t>
+              <a:t>11/11/2020</a:t>
             </a:fld>
             <a:endParaRPr lang="pt-BR"/>
           </a:p>
@@ -2546,7 +2546,7 @@
           <a:p>
             <a:fld id="{B318167A-7346-46C7-A193-E3829EEED7F1}" type="datetimeFigureOut">
               <a:rPr lang="pt-BR" smtClean="0"/>
-              <a:t>04/11/2020</a:t>
+              <a:t>11/11/2020</a:t>
             </a:fld>
             <a:endParaRPr lang="pt-BR"/>
           </a:p>
@@ -4726,7 +4726,7 @@
         </p:nvSpPr>
         <p:spPr>
           <a:xfrm>
-            <a:off x="7735231" y="2217132"/>
+            <a:off x="6556053" y="2273272"/>
             <a:ext cx="3480294" cy="461665"/>
           </a:xfrm>
           <a:prstGeom prst="rect">

</xml_diff>

<commit_message>
Refatorando artefatos seguindo a correção da ac5
</commit_message>
<xml_diff>
--- a/artefatos/15 - Arquitetura de Negócio para cada Cenário.pptx
+++ b/artefatos/15 - Arquitetura de Negócio para cada Cenário.pptx
@@ -244,7 +244,7 @@
           <a:p>
             <a:fld id="{B318167A-7346-46C7-A193-E3829EEED7F1}" type="datetimeFigureOut">
               <a:rPr lang="pt-BR" smtClean="0"/>
-              <a:t>11/11/2020</a:t>
+              <a:t>18/11/2020</a:t>
             </a:fld>
             <a:endParaRPr lang="pt-BR"/>
           </a:p>
@@ -412,7 +412,7 @@
           <a:p>
             <a:fld id="{B318167A-7346-46C7-A193-E3829EEED7F1}" type="datetimeFigureOut">
               <a:rPr lang="pt-BR" smtClean="0"/>
-              <a:t>11/11/2020</a:t>
+              <a:t>18/11/2020</a:t>
             </a:fld>
             <a:endParaRPr lang="pt-BR"/>
           </a:p>
@@ -590,7 +590,7 @@
           <a:p>
             <a:fld id="{B318167A-7346-46C7-A193-E3829EEED7F1}" type="datetimeFigureOut">
               <a:rPr lang="pt-BR" smtClean="0"/>
-              <a:t>11/11/2020</a:t>
+              <a:t>18/11/2020</a:t>
             </a:fld>
             <a:endParaRPr lang="pt-BR"/>
           </a:p>
@@ -758,7 +758,7 @@
           <a:p>
             <a:fld id="{B318167A-7346-46C7-A193-E3829EEED7F1}" type="datetimeFigureOut">
               <a:rPr lang="pt-BR" smtClean="0"/>
-              <a:t>11/11/2020</a:t>
+              <a:t>18/11/2020</a:t>
             </a:fld>
             <a:endParaRPr lang="pt-BR"/>
           </a:p>
@@ -1003,7 +1003,7 @@
           <a:p>
             <a:fld id="{B318167A-7346-46C7-A193-E3829EEED7F1}" type="datetimeFigureOut">
               <a:rPr lang="pt-BR" smtClean="0"/>
-              <a:t>11/11/2020</a:t>
+              <a:t>18/11/2020</a:t>
             </a:fld>
             <a:endParaRPr lang="pt-BR"/>
           </a:p>
@@ -1232,7 +1232,7 @@
           <a:p>
             <a:fld id="{B318167A-7346-46C7-A193-E3829EEED7F1}" type="datetimeFigureOut">
               <a:rPr lang="pt-BR" smtClean="0"/>
-              <a:t>11/11/2020</a:t>
+              <a:t>18/11/2020</a:t>
             </a:fld>
             <a:endParaRPr lang="pt-BR"/>
           </a:p>
@@ -1596,7 +1596,7 @@
           <a:p>
             <a:fld id="{B318167A-7346-46C7-A193-E3829EEED7F1}" type="datetimeFigureOut">
               <a:rPr lang="pt-BR" smtClean="0"/>
-              <a:t>11/11/2020</a:t>
+              <a:t>18/11/2020</a:t>
             </a:fld>
             <a:endParaRPr lang="pt-BR"/>
           </a:p>
@@ -1713,7 +1713,7 @@
           <a:p>
             <a:fld id="{B318167A-7346-46C7-A193-E3829EEED7F1}" type="datetimeFigureOut">
               <a:rPr lang="pt-BR" smtClean="0"/>
-              <a:t>11/11/2020</a:t>
+              <a:t>18/11/2020</a:t>
             </a:fld>
             <a:endParaRPr lang="pt-BR"/>
           </a:p>
@@ -1808,7 +1808,7 @@
           <a:p>
             <a:fld id="{B318167A-7346-46C7-A193-E3829EEED7F1}" type="datetimeFigureOut">
               <a:rPr lang="pt-BR" smtClean="0"/>
-              <a:t>11/11/2020</a:t>
+              <a:t>18/11/2020</a:t>
             </a:fld>
             <a:endParaRPr lang="pt-BR"/>
           </a:p>
@@ -2083,7 +2083,7 @@
           <a:p>
             <a:fld id="{B318167A-7346-46C7-A193-E3829EEED7F1}" type="datetimeFigureOut">
               <a:rPr lang="pt-BR" smtClean="0"/>
-              <a:t>11/11/2020</a:t>
+              <a:t>18/11/2020</a:t>
             </a:fld>
             <a:endParaRPr lang="pt-BR"/>
           </a:p>
@@ -2335,7 +2335,7 @@
           <a:p>
             <a:fld id="{B318167A-7346-46C7-A193-E3829EEED7F1}" type="datetimeFigureOut">
               <a:rPr lang="pt-BR" smtClean="0"/>
-              <a:t>11/11/2020</a:t>
+              <a:t>18/11/2020</a:t>
             </a:fld>
             <a:endParaRPr lang="pt-BR"/>
           </a:p>
@@ -2546,7 +2546,7 @@
           <a:p>
             <a:fld id="{B318167A-7346-46C7-A193-E3829EEED7F1}" type="datetimeFigureOut">
               <a:rPr lang="pt-BR" smtClean="0"/>
-              <a:t>11/11/2020</a:t>
+              <a:t>18/11/2020</a:t>
             </a:fld>
             <a:endParaRPr lang="pt-BR"/>
           </a:p>

</xml_diff>